<commit_message>
NONRTRIC - Using S3 storage for ICS
Documentation updates.

Signed-off-by: PatrikBuhr <patrik.buhr@est.tech>
Issue-ID: NONRTRIC-811
Change-Id: I221d3be8c8f4c5e84a8755abd15d0dfa905002b1
</commit_message>
<xml_diff>
--- a/docs/Architecture.pptx
+++ b/docs/Architecture.pptx
@@ -1653,8 +1653,8 @@
         </p:nvSpPr>
         <p:spPr>
           <a:xfrm>
-            <a:off x="3564360" y="3875400"/>
-            <a:ext cx="1510200" cy="515880"/>
+            <a:off x="3960000" y="2220120"/>
+            <a:ext cx="1509840" cy="515880"/>
           </a:xfrm>
           <a:prstGeom prst="rect">
             <a:avLst/>
@@ -1705,7 +1705,7 @@
         <p:spPr>
           <a:xfrm>
             <a:off x="72000" y="81000"/>
-            <a:ext cx="2232000" cy="363960"/>
+            <a:ext cx="2231640" cy="363960"/>
           </a:xfrm>
           <a:prstGeom prst="rect">
             <a:avLst/>
@@ -1758,7 +1758,7 @@
         <p:spPr>
           <a:xfrm>
             <a:off x="7812000" y="1188000"/>
-            <a:ext cx="1996200" cy="987480"/>
+            <a:ext cx="1995840" cy="987120"/>
           </a:xfrm>
           <a:prstGeom prst="roundRect">
             <a:avLst>
@@ -1823,7 +1823,7 @@
         <p:spPr>
           <a:xfrm>
             <a:off x="4176000" y="1512720"/>
-            <a:ext cx="3382920" cy="430200"/>
+            <a:ext cx="3382560" cy="429840"/>
           </a:xfrm>
           <a:custGeom>
             <a:avLst/>
@@ -1883,8 +1883,8 @@
         </p:nvSpPr>
         <p:spPr>
           <a:xfrm>
-            <a:off x="6804000" y="3875400"/>
-            <a:ext cx="1773000" cy="515880"/>
+            <a:off x="6363360" y="2232000"/>
+            <a:ext cx="1772640" cy="515880"/>
           </a:xfrm>
           <a:prstGeom prst="rect">
             <a:avLst/>
@@ -1934,8 +1934,8 @@
         </p:nvSpPr>
         <p:spPr>
           <a:xfrm flipH="1">
-            <a:off x="6300000" y="2340000"/>
-            <a:ext cx="1656000" cy="2160000"/>
+            <a:off x="6840000" y="2340000"/>
+            <a:ext cx="1116000" cy="1476000"/>
           </a:xfrm>
           <a:prstGeom prst="line">
             <a:avLst/>
@@ -1962,7 +1962,7 @@
         </p:nvSpPr>
         <p:spPr>
           <a:xfrm>
-            <a:off x="3600000" y="2232000"/>
+            <a:off x="2952000" y="1368000"/>
             <a:ext cx="1872000" cy="2376000"/>
           </a:xfrm>
           <a:prstGeom prst="line">
@@ -1991,7 +1991,7 @@
         </p:nvSpPr>
         <p:spPr>
           <a:xfrm>
-            <a:off x="3636000" y="3708000"/>
+            <a:off x="3672000" y="2808000"/>
             <a:ext cx="4824000" cy="0"/>
           </a:xfrm>
           <a:prstGeom prst="line">
@@ -2019,8 +2019,8 @@
         </p:nvSpPr>
         <p:spPr>
           <a:xfrm>
-            <a:off x="8604000" y="3600000"/>
-            <a:ext cx="3105000" cy="302760"/>
+            <a:off x="8847360" y="2592000"/>
+            <a:ext cx="3104640" cy="302760"/>
           </a:xfrm>
           <a:prstGeom prst="rect">
             <a:avLst/>
@@ -2070,8 +2070,8 @@
         </p:nvSpPr>
         <p:spPr>
           <a:xfrm>
-            <a:off x="5022360" y="4668120"/>
-            <a:ext cx="2284200" cy="1414440"/>
+            <a:off x="4700160" y="3816000"/>
+            <a:ext cx="2283840" cy="1414080"/>
           </a:xfrm>
           <a:prstGeom prst="roundRect">
             <a:avLst>
@@ -2153,8 +2153,8 @@
         </p:nvSpPr>
         <p:spPr>
           <a:xfrm>
-            <a:off x="5022360" y="4668120"/>
-            <a:ext cx="2284200" cy="1414440"/>
+            <a:off x="4700160" y="3816000"/>
+            <a:ext cx="2283840" cy="1414080"/>
           </a:xfrm>
           <a:prstGeom prst="roundRect">
             <a:avLst>
@@ -2256,8 +2256,8 @@
         </p:nvSpPr>
         <p:spPr>
           <a:xfrm>
-            <a:off x="1459440" y="5636160"/>
-            <a:ext cx="1996200" cy="987480"/>
+            <a:off x="1244160" y="5040000"/>
+            <a:ext cx="1995840" cy="987120"/>
           </a:xfrm>
           <a:prstGeom prst="roundRect">
             <a:avLst>
@@ -2341,8 +2341,8 @@
         </p:nvSpPr>
         <p:spPr>
           <a:xfrm>
-            <a:off x="3339000" y="4881240"/>
-            <a:ext cx="1773000" cy="302760"/>
+            <a:off x="2835360" y="4176000"/>
+            <a:ext cx="1772640" cy="302760"/>
           </a:xfrm>
           <a:prstGeom prst="rect">
             <a:avLst/>
@@ -2392,7 +2392,7 @@
         </p:nvSpPr>
         <p:spPr>
           <a:xfrm>
-            <a:off x="4104000" y="5255280"/>
+            <a:off x="3600000" y="4536000"/>
             <a:ext cx="360000" cy="864720"/>
           </a:xfrm>
           <a:prstGeom prst="line">
@@ -2420,7 +2420,7 @@
         </p:nvSpPr>
         <p:spPr>
           <a:xfrm flipH="1">
-            <a:off x="3672000" y="5544000"/>
+            <a:off x="3312000" y="4680000"/>
             <a:ext cx="1188000" cy="504000"/>
           </a:xfrm>
           <a:prstGeom prst="line">
@@ -2449,8 +2449,8 @@
         </p:nvSpPr>
         <p:spPr>
           <a:xfrm flipH="1" rot="16154400">
-            <a:off x="939960" y="3829680"/>
-            <a:ext cx="3118320" cy="288360"/>
+            <a:off x="1002240" y="3547080"/>
+            <a:ext cx="2553480" cy="288000"/>
           </a:xfrm>
           <a:custGeom>
             <a:avLst/>
@@ -2511,7 +2511,7 @@
         <p:spPr>
           <a:xfrm>
             <a:off x="4391640" y="657720"/>
-            <a:ext cx="2232000" cy="638280"/>
+            <a:ext cx="2231640" cy="638280"/>
           </a:xfrm>
           <a:prstGeom prst="rect">
             <a:avLst/>
@@ -2584,7 +2584,7 @@
         <p:spPr>
           <a:xfrm>
             <a:off x="1296000" y="1152000"/>
-            <a:ext cx="1996200" cy="987480"/>
+            <a:ext cx="1995840" cy="987120"/>
           </a:xfrm>
           <a:prstGeom prst="roundRect">
             <a:avLst>
@@ -2649,7 +2649,7 @@
         <p:spPr>
           <a:xfrm>
             <a:off x="504000" y="3119400"/>
-            <a:ext cx="1871640" cy="912600"/>
+            <a:ext cx="1512000" cy="1186920"/>
           </a:xfrm>
           <a:prstGeom prst="rect">
             <a:avLst/>
@@ -2708,6 +2708,177 @@
               <a:t>(any protocol)</a:t>
             </a:r>
             <a:endParaRPr b="0" lang="sv-SE" sz="1800" spc="-1" strike="noStrike">
+              <a:latin typeface="Arial"/>
+            </a:endParaRPr>
+          </a:p>
+        </p:txBody>
+      </p:sp>
+      <p:sp>
+        <p:nvSpPr>
+          <p:cNvPr id="57" name="CustomShape 20"/>
+          <p:cNvSpPr/>
+          <p:nvPr/>
+        </p:nvSpPr>
+        <p:spPr>
+          <a:xfrm>
+            <a:off x="4248000" y="5786280"/>
+            <a:ext cx="3312000" cy="981720"/>
+          </a:xfrm>
+          <a:prstGeom prst="roundRect">
+            <a:avLst>
+              <a:gd name="adj" fmla="val 16667"/>
+            </a:avLst>
+          </a:prstGeom>
+          <a:solidFill>
+            <a:srgbClr val="2a6099"/>
+          </a:solidFill>
+          <a:ln/>
+        </p:spPr>
+        <p:style>
+          <a:lnRef idx="2">
+            <a:schemeClr val="accent1">
+              <a:shade val="50000"/>
+            </a:schemeClr>
+          </a:lnRef>
+          <a:fillRef idx="1">
+            <a:schemeClr val="accent1"/>
+          </a:fillRef>
+          <a:effectRef idx="0">
+            <a:schemeClr val="accent1"/>
+          </a:effectRef>
+          <a:fontRef idx="minor"/>
+        </p:style>
+        <p:txBody>
+          <a:bodyPr lIns="90000" rIns="90000" tIns="45000" bIns="45000" anchor="ctr">
+            <a:noAutofit/>
+          </a:bodyPr>
+          <a:p>
+            <a:pPr algn="ctr">
+              <a:lnSpc>
+                <a:spcPct val="100000"/>
+              </a:lnSpc>
+            </a:pPr>
+            <a:r>
+              <a:rPr b="0" lang="sv-SE" sz="1800" spc="-1" strike="noStrike">
+                <a:solidFill>
+                  <a:srgbClr val="000000"/>
+                </a:solidFill>
+                <a:latin typeface="Arial"/>
+                <a:ea typeface="DejaVu Sans"/>
+              </a:rPr>
+              <a:t>S3 Object Store</a:t>
+            </a:r>
+            <a:endParaRPr b="0" lang="sv-SE" sz="1800" spc="-1" strike="noStrike">
+              <a:latin typeface="Arial"/>
+            </a:endParaRPr>
+          </a:p>
+          <a:p>
+            <a:pPr algn="ctr">
+              <a:lnSpc>
+                <a:spcPct val="100000"/>
+              </a:lnSpc>
+            </a:pPr>
+            <a:r>
+              <a:rPr b="0" lang="sv-SE" sz="1800" spc="-1" strike="noStrike">
+                <a:solidFill>
+                  <a:srgbClr val="000000"/>
+                </a:solidFill>
+                <a:latin typeface="Arial"/>
+                <a:ea typeface="DejaVu Sans"/>
+              </a:rPr>
+              <a:t>Or</a:t>
+            </a:r>
+            <a:br/>
+            <a:r>
+              <a:rPr b="0" lang="sv-SE" sz="1800" spc="-1" strike="noStrike">
+                <a:solidFill>
+                  <a:srgbClr val="000000"/>
+                </a:solidFill>
+                <a:latin typeface="Arial"/>
+                <a:ea typeface="DejaVu Sans"/>
+              </a:rPr>
+              <a:t>Cluster Volume (filesystem)</a:t>
+            </a:r>
+            <a:endParaRPr b="0" lang="sv-SE" sz="1800" spc="-1" strike="noStrike">
+              <a:latin typeface="Arial"/>
+            </a:endParaRPr>
+          </a:p>
+        </p:txBody>
+      </p:sp>
+      <p:sp>
+        <p:nvSpPr>
+          <p:cNvPr id="58" name="Line 21"/>
+          <p:cNvSpPr/>
+          <p:nvPr/>
+        </p:nvSpPr>
+        <p:spPr>
+          <a:xfrm>
+            <a:off x="5760000" y="5246280"/>
+            <a:ext cx="0" cy="504000"/>
+          </a:xfrm>
+          <a:prstGeom prst="line">
+            <a:avLst/>
+          </a:prstGeom>
+          <a:ln>
+            <a:solidFill>
+              <a:srgbClr val="3465a4"/>
+            </a:solidFill>
+            <a:tailEnd len="med" type="triangle" w="med"/>
+          </a:ln>
+        </p:spPr>
+        <p:style>
+          <a:lnRef idx="0"/>
+          <a:fillRef idx="0"/>
+          <a:effectRef idx="0"/>
+          <a:fontRef idx="minor"/>
+        </p:style>
+      </p:sp>
+      <p:sp>
+        <p:nvSpPr>
+          <p:cNvPr id="59" name="CustomShape 22"/>
+          <p:cNvSpPr/>
+          <p:nvPr/>
+        </p:nvSpPr>
+        <p:spPr>
+          <a:xfrm>
+            <a:off x="7848000" y="6105240"/>
+            <a:ext cx="3104640" cy="302760"/>
+          </a:xfrm>
+          <a:prstGeom prst="rect">
+            <a:avLst/>
+          </a:prstGeom>
+          <a:noFill/>
+          <a:ln>
+            <a:noFill/>
+          </a:ln>
+        </p:spPr>
+        <p:style>
+          <a:lnRef idx="0"/>
+          <a:fillRef idx="0"/>
+          <a:effectRef idx="0"/>
+          <a:fontRef idx="minor"/>
+        </p:style>
+        <p:txBody>
+          <a:bodyPr lIns="90000" rIns="90000" tIns="45000" bIns="45000">
+            <a:spAutoFit/>
+          </a:bodyPr>
+          <a:p>
+            <a:pPr>
+              <a:lnSpc>
+                <a:spcPct val="100000"/>
+              </a:lnSpc>
+            </a:pPr>
+            <a:r>
+              <a:rPr b="0" lang="sv-SE" sz="1400" spc="-1" strike="noStrike">
+                <a:solidFill>
+                  <a:srgbClr val="000000"/>
+                </a:solidFill>
+                <a:latin typeface="Calibri"/>
+                <a:ea typeface="Calibri"/>
+              </a:rPr>
+              <a:t>Persistent storage</a:t>
+            </a:r>
+            <a:endParaRPr b="0" lang="sv-SE" sz="1400" spc="-1" strike="noStrike">
               <a:latin typeface="Arial"/>
             </a:endParaRPr>
           </a:p>

</xml_diff>

<commit_message>
NONRTRIC - Fine grained authorization in ICS
Documentation updates.

Signed-off-by: PatrikBuhr <patrik.buhr@est.tech>
Issue-ID: NONRTRIC-815
Change-Id: I831963780ef0db6e4a7d35895439fb05864cb6b1
</commit_message>
<xml_diff>
--- a/docs/Architecture.pptx
+++ b/docs/Architecture.pptx
@@ -53,7 +53,7 @@
       </p:grpSpPr>
       <p:sp>
         <p:nvSpPr>
-          <p:cNvPr id="23" name="PlaceHolder 1"/>
+          <p:cNvPr id="21" name="PlaceHolder 1"/>
           <p:cNvSpPr>
             <a:spLocks noGrp="1"/>
           </p:cNvSpPr>
@@ -84,7 +84,7 @@
       </p:sp>
       <p:sp>
         <p:nvSpPr>
-          <p:cNvPr id="24" name="PlaceHolder 2"/>
+          <p:cNvPr id="22" name="PlaceHolder 2"/>
           <p:cNvSpPr>
             <a:spLocks noGrp="1"/>
           </p:cNvSpPr>
@@ -114,7 +114,7 @@
       </p:sp>
       <p:sp>
         <p:nvSpPr>
-          <p:cNvPr id="25" name="PlaceHolder 3"/>
+          <p:cNvPr id="23" name="PlaceHolder 3"/>
           <p:cNvSpPr>
             <a:spLocks noGrp="1"/>
           </p:cNvSpPr>
@@ -166,7 +166,7 @@
       </p:grpSpPr>
       <p:sp>
         <p:nvSpPr>
-          <p:cNvPr id="26" name="PlaceHolder 1"/>
+          <p:cNvPr id="24" name="PlaceHolder 1"/>
           <p:cNvSpPr>
             <a:spLocks noGrp="1"/>
           </p:cNvSpPr>
@@ -197,7 +197,7 @@
       </p:sp>
       <p:sp>
         <p:nvSpPr>
-          <p:cNvPr id="27" name="PlaceHolder 2"/>
+          <p:cNvPr id="25" name="PlaceHolder 2"/>
           <p:cNvSpPr>
             <a:spLocks noGrp="1"/>
           </p:cNvSpPr>
@@ -227,7 +227,7 @@
       </p:sp>
       <p:sp>
         <p:nvSpPr>
-          <p:cNvPr id="28" name="PlaceHolder 3"/>
+          <p:cNvPr id="26" name="PlaceHolder 3"/>
           <p:cNvSpPr>
             <a:spLocks noGrp="1"/>
           </p:cNvSpPr>
@@ -257,7 +257,7 @@
       </p:sp>
       <p:sp>
         <p:nvSpPr>
-          <p:cNvPr id="29" name="PlaceHolder 4"/>
+          <p:cNvPr id="27" name="PlaceHolder 4"/>
           <p:cNvSpPr>
             <a:spLocks noGrp="1"/>
           </p:cNvSpPr>
@@ -287,7 +287,7 @@
       </p:sp>
       <p:sp>
         <p:nvSpPr>
-          <p:cNvPr id="30" name="PlaceHolder 5"/>
+          <p:cNvPr id="28" name="PlaceHolder 5"/>
           <p:cNvSpPr>
             <a:spLocks noGrp="1"/>
           </p:cNvSpPr>
@@ -339,7 +339,7 @@
       </p:grpSpPr>
       <p:sp>
         <p:nvSpPr>
-          <p:cNvPr id="31" name="PlaceHolder 1"/>
+          <p:cNvPr id="29" name="PlaceHolder 1"/>
           <p:cNvSpPr>
             <a:spLocks noGrp="1"/>
           </p:cNvSpPr>
@@ -370,7 +370,7 @@
       </p:sp>
       <p:sp>
         <p:nvSpPr>
-          <p:cNvPr id="32" name="PlaceHolder 2"/>
+          <p:cNvPr id="30" name="PlaceHolder 2"/>
           <p:cNvSpPr>
             <a:spLocks noGrp="1"/>
           </p:cNvSpPr>
@@ -400,7 +400,7 @@
       </p:sp>
       <p:sp>
         <p:nvSpPr>
-          <p:cNvPr id="33" name="PlaceHolder 3"/>
+          <p:cNvPr id="31" name="PlaceHolder 3"/>
           <p:cNvSpPr>
             <a:spLocks noGrp="1"/>
           </p:cNvSpPr>
@@ -430,7 +430,7 @@
       </p:sp>
       <p:sp>
         <p:nvSpPr>
-          <p:cNvPr id="34" name="PlaceHolder 4"/>
+          <p:cNvPr id="32" name="PlaceHolder 4"/>
           <p:cNvSpPr>
             <a:spLocks noGrp="1"/>
           </p:cNvSpPr>
@@ -460,7 +460,7 @@
       </p:sp>
       <p:sp>
         <p:nvSpPr>
-          <p:cNvPr id="35" name="PlaceHolder 5"/>
+          <p:cNvPr id="33" name="PlaceHolder 5"/>
           <p:cNvSpPr>
             <a:spLocks noGrp="1"/>
           </p:cNvSpPr>
@@ -490,7 +490,7 @@
       </p:sp>
       <p:sp>
         <p:nvSpPr>
-          <p:cNvPr id="36" name="PlaceHolder 6"/>
+          <p:cNvPr id="34" name="PlaceHolder 6"/>
           <p:cNvSpPr>
             <a:spLocks noGrp="1"/>
           </p:cNvSpPr>
@@ -520,7 +520,7 @@
       </p:sp>
       <p:sp>
         <p:nvSpPr>
-          <p:cNvPr id="37" name="PlaceHolder 7"/>
+          <p:cNvPr id="35" name="PlaceHolder 7"/>
           <p:cNvSpPr>
             <a:spLocks noGrp="1"/>
           </p:cNvSpPr>
@@ -572,7 +572,7 @@
       </p:grpSpPr>
       <p:sp>
         <p:nvSpPr>
-          <p:cNvPr id="2" name="PlaceHolder 1"/>
+          <p:cNvPr id="0" name="PlaceHolder 1"/>
           <p:cNvSpPr>
             <a:spLocks noGrp="1"/>
           </p:cNvSpPr>
@@ -603,7 +603,7 @@
       </p:sp>
       <p:sp>
         <p:nvSpPr>
-          <p:cNvPr id="3" name="PlaceHolder 2"/>
+          <p:cNvPr id="1" name="PlaceHolder 2"/>
           <p:cNvSpPr>
             <a:spLocks noGrp="1"/>
           </p:cNvSpPr>
@@ -656,7 +656,7 @@
       </p:grpSpPr>
       <p:sp>
         <p:nvSpPr>
-          <p:cNvPr id="4" name="PlaceHolder 1"/>
+          <p:cNvPr id="2" name="PlaceHolder 1"/>
           <p:cNvSpPr>
             <a:spLocks noGrp="1"/>
           </p:cNvSpPr>
@@ -687,7 +687,7 @@
       </p:sp>
       <p:sp>
         <p:nvSpPr>
-          <p:cNvPr id="5" name="PlaceHolder 2"/>
+          <p:cNvPr id="3" name="PlaceHolder 2"/>
           <p:cNvSpPr>
             <a:spLocks noGrp="1"/>
           </p:cNvSpPr>
@@ -739,7 +739,7 @@
       </p:grpSpPr>
       <p:sp>
         <p:nvSpPr>
-          <p:cNvPr id="6" name="PlaceHolder 1"/>
+          <p:cNvPr id="4" name="PlaceHolder 1"/>
           <p:cNvSpPr>
             <a:spLocks noGrp="1"/>
           </p:cNvSpPr>
@@ -770,7 +770,7 @@
       </p:sp>
       <p:sp>
         <p:nvSpPr>
-          <p:cNvPr id="7" name="PlaceHolder 2"/>
+          <p:cNvPr id="5" name="PlaceHolder 2"/>
           <p:cNvSpPr>
             <a:spLocks noGrp="1"/>
           </p:cNvSpPr>
@@ -800,7 +800,7 @@
       </p:sp>
       <p:sp>
         <p:nvSpPr>
-          <p:cNvPr id="8" name="PlaceHolder 3"/>
+          <p:cNvPr id="6" name="PlaceHolder 3"/>
           <p:cNvSpPr>
             <a:spLocks noGrp="1"/>
           </p:cNvSpPr>
@@ -852,7 +852,7 @@
       </p:grpSpPr>
       <p:sp>
         <p:nvSpPr>
-          <p:cNvPr id="9" name="PlaceHolder 1"/>
+          <p:cNvPr id="7" name="PlaceHolder 1"/>
           <p:cNvSpPr>
             <a:spLocks noGrp="1"/>
           </p:cNvSpPr>
@@ -905,7 +905,7 @@
       </p:grpSpPr>
       <p:sp>
         <p:nvSpPr>
-          <p:cNvPr id="10" name="PlaceHolder 1"/>
+          <p:cNvPr id="8" name="PlaceHolder 1"/>
           <p:cNvSpPr>
             <a:spLocks noGrp="1"/>
           </p:cNvSpPr>
@@ -958,7 +958,7 @@
       </p:grpSpPr>
       <p:sp>
         <p:nvSpPr>
-          <p:cNvPr id="11" name="PlaceHolder 1"/>
+          <p:cNvPr id="9" name="PlaceHolder 1"/>
           <p:cNvSpPr>
             <a:spLocks noGrp="1"/>
           </p:cNvSpPr>
@@ -989,7 +989,7 @@
       </p:sp>
       <p:sp>
         <p:nvSpPr>
-          <p:cNvPr id="12" name="PlaceHolder 2"/>
+          <p:cNvPr id="10" name="PlaceHolder 2"/>
           <p:cNvSpPr>
             <a:spLocks noGrp="1"/>
           </p:cNvSpPr>
@@ -1019,7 +1019,7 @@
       </p:sp>
       <p:sp>
         <p:nvSpPr>
-          <p:cNvPr id="13" name="PlaceHolder 3"/>
+          <p:cNvPr id="11" name="PlaceHolder 3"/>
           <p:cNvSpPr>
             <a:spLocks noGrp="1"/>
           </p:cNvSpPr>
@@ -1049,7 +1049,7 @@
       </p:sp>
       <p:sp>
         <p:nvSpPr>
-          <p:cNvPr id="14" name="PlaceHolder 4"/>
+          <p:cNvPr id="12" name="PlaceHolder 4"/>
           <p:cNvSpPr>
             <a:spLocks noGrp="1"/>
           </p:cNvSpPr>
@@ -1101,7 +1101,7 @@
       </p:grpSpPr>
       <p:sp>
         <p:nvSpPr>
-          <p:cNvPr id="15" name="PlaceHolder 1"/>
+          <p:cNvPr id="13" name="PlaceHolder 1"/>
           <p:cNvSpPr>
             <a:spLocks noGrp="1"/>
           </p:cNvSpPr>
@@ -1132,7 +1132,7 @@
       </p:sp>
       <p:sp>
         <p:nvSpPr>
-          <p:cNvPr id="16" name="PlaceHolder 2"/>
+          <p:cNvPr id="14" name="PlaceHolder 2"/>
           <p:cNvSpPr>
             <a:spLocks noGrp="1"/>
           </p:cNvSpPr>
@@ -1162,7 +1162,7 @@
       </p:sp>
       <p:sp>
         <p:nvSpPr>
-          <p:cNvPr id="17" name="PlaceHolder 3"/>
+          <p:cNvPr id="15" name="PlaceHolder 3"/>
           <p:cNvSpPr>
             <a:spLocks noGrp="1"/>
           </p:cNvSpPr>
@@ -1192,7 +1192,7 @@
       </p:sp>
       <p:sp>
         <p:nvSpPr>
-          <p:cNvPr id="18" name="PlaceHolder 4"/>
+          <p:cNvPr id="16" name="PlaceHolder 4"/>
           <p:cNvSpPr>
             <a:spLocks noGrp="1"/>
           </p:cNvSpPr>
@@ -1244,7 +1244,7 @@
       </p:grpSpPr>
       <p:sp>
         <p:nvSpPr>
-          <p:cNvPr id="19" name="PlaceHolder 1"/>
+          <p:cNvPr id="17" name="PlaceHolder 1"/>
           <p:cNvSpPr>
             <a:spLocks noGrp="1"/>
           </p:cNvSpPr>
@@ -1275,7 +1275,7 @@
       </p:sp>
       <p:sp>
         <p:nvSpPr>
-          <p:cNvPr id="20" name="PlaceHolder 2"/>
+          <p:cNvPr id="18" name="PlaceHolder 2"/>
           <p:cNvSpPr>
             <a:spLocks noGrp="1"/>
           </p:cNvSpPr>
@@ -1305,7 +1305,7 @@
       </p:sp>
       <p:sp>
         <p:nvSpPr>
-          <p:cNvPr id="21" name="PlaceHolder 3"/>
+          <p:cNvPr id="19" name="PlaceHolder 3"/>
           <p:cNvSpPr>
             <a:spLocks noGrp="1"/>
           </p:cNvSpPr>
@@ -1335,7 +1335,7 @@
       </p:sp>
       <p:sp>
         <p:nvSpPr>
-          <p:cNvPr id="22" name="PlaceHolder 4"/>
+          <p:cNvPr id="20" name="PlaceHolder 4"/>
           <p:cNvSpPr>
             <a:spLocks noGrp="1"/>
           </p:cNvSpPr>
@@ -1392,222 +1392,6 @@
           <a:chExt cx="0" cy="0"/>
         </a:xfrm>
       </p:grpSpPr>
-      <p:sp>
-        <p:nvSpPr>
-          <p:cNvPr id="0" name="PlaceHolder 1"/>
-          <p:cNvSpPr>
-            <a:spLocks noGrp="1"/>
-          </p:cNvSpPr>
-          <p:nvPr>
-            <p:ph type="title"/>
-          </p:nvPr>
-        </p:nvSpPr>
-        <p:spPr>
-          <a:xfrm>
-            <a:off x="609480" y="273600"/>
-            <a:ext cx="10972440" cy="1144800"/>
-          </a:xfrm>
-          <a:prstGeom prst="rect">
-            <a:avLst/>
-          </a:prstGeom>
-        </p:spPr>
-        <p:txBody>
-          <a:bodyPr lIns="0" rIns="0" tIns="0" bIns="0" anchor="ctr">
-            <a:noAutofit/>
-          </a:bodyPr>
-          <a:p>
-            <a:pPr algn="ctr"/>
-            <a:r>
-              <a:rPr b="0" lang="sv-SE" sz="4400" spc="-1" strike="noStrike">
-                <a:latin typeface="Arial"/>
-              </a:rPr>
-              <a:t>Click to edit the title text format</a:t>
-            </a:r>
-            <a:endParaRPr b="0" lang="sv-SE" sz="4400" spc="-1" strike="noStrike">
-              <a:latin typeface="Arial"/>
-            </a:endParaRPr>
-          </a:p>
-        </p:txBody>
-      </p:sp>
-      <p:sp>
-        <p:nvSpPr>
-          <p:cNvPr id="1" name="PlaceHolder 2"/>
-          <p:cNvSpPr>
-            <a:spLocks noGrp="1"/>
-          </p:cNvSpPr>
-          <p:nvPr>
-            <p:ph type="body"/>
-          </p:nvPr>
-        </p:nvSpPr>
-        <p:spPr>
-          <a:xfrm>
-            <a:off x="609480" y="1604520"/>
-            <a:ext cx="10972440" cy="3977280"/>
-          </a:xfrm>
-          <a:prstGeom prst="rect">
-            <a:avLst/>
-          </a:prstGeom>
-        </p:spPr>
-        <p:txBody>
-          <a:bodyPr lIns="0" rIns="0" tIns="0" bIns="0">
-            <a:normAutofit/>
-          </a:bodyPr>
-          <a:p>
-            <a:pPr marL="432000" indent="-324000">
-              <a:spcBef>
-                <a:spcPts val="1417"/>
-              </a:spcBef>
-              <a:buClr>
-                <a:srgbClr val="000000"/>
-              </a:buClr>
-              <a:buSzPct val="45000"/>
-              <a:buFont typeface="Wingdings" charset="2"/>
-              <a:buChar char=""/>
-            </a:pPr>
-            <a:r>
-              <a:rPr b="0" lang="sv-SE" sz="3200" spc="-1" strike="noStrike">
-                <a:latin typeface="Arial"/>
-              </a:rPr>
-              <a:t>Click to edit the outline text format</a:t>
-            </a:r>
-            <a:endParaRPr b="0" lang="sv-SE" sz="3200" spc="-1" strike="noStrike">
-              <a:latin typeface="Arial"/>
-            </a:endParaRPr>
-          </a:p>
-          <a:p>
-            <a:pPr lvl="1" marL="864000" indent="-324000">
-              <a:spcBef>
-                <a:spcPts val="1134"/>
-              </a:spcBef>
-              <a:buClr>
-                <a:srgbClr val="000000"/>
-              </a:buClr>
-              <a:buSzPct val="75000"/>
-              <a:buFont typeface="Symbol" charset="2"/>
-              <a:buChar char=""/>
-            </a:pPr>
-            <a:r>
-              <a:rPr b="0" lang="sv-SE" sz="2800" spc="-1" strike="noStrike">
-                <a:latin typeface="Arial"/>
-              </a:rPr>
-              <a:t>Second Outline Level</a:t>
-            </a:r>
-            <a:endParaRPr b="0" lang="sv-SE" sz="2800" spc="-1" strike="noStrike">
-              <a:latin typeface="Arial"/>
-            </a:endParaRPr>
-          </a:p>
-          <a:p>
-            <a:pPr lvl="2" marL="1296000" indent="-288000">
-              <a:spcBef>
-                <a:spcPts val="850"/>
-              </a:spcBef>
-              <a:buClr>
-                <a:srgbClr val="000000"/>
-              </a:buClr>
-              <a:buSzPct val="45000"/>
-              <a:buFont typeface="Wingdings" charset="2"/>
-              <a:buChar char=""/>
-            </a:pPr>
-            <a:r>
-              <a:rPr b="0" lang="sv-SE" sz="2400" spc="-1" strike="noStrike">
-                <a:latin typeface="Arial"/>
-              </a:rPr>
-              <a:t>Third Outline Level</a:t>
-            </a:r>
-            <a:endParaRPr b="0" lang="sv-SE" sz="2400" spc="-1" strike="noStrike">
-              <a:latin typeface="Arial"/>
-            </a:endParaRPr>
-          </a:p>
-          <a:p>
-            <a:pPr lvl="3" marL="1728000" indent="-216000">
-              <a:spcBef>
-                <a:spcPts val="567"/>
-              </a:spcBef>
-              <a:buClr>
-                <a:srgbClr val="000000"/>
-              </a:buClr>
-              <a:buSzPct val="75000"/>
-              <a:buFont typeface="Symbol" charset="2"/>
-              <a:buChar char=""/>
-            </a:pPr>
-            <a:r>
-              <a:rPr b="0" lang="sv-SE" sz="2000" spc="-1" strike="noStrike">
-                <a:latin typeface="Arial"/>
-              </a:rPr>
-              <a:t>Fourth Outline Level</a:t>
-            </a:r>
-            <a:endParaRPr b="0" lang="sv-SE" sz="2000" spc="-1" strike="noStrike">
-              <a:latin typeface="Arial"/>
-            </a:endParaRPr>
-          </a:p>
-          <a:p>
-            <a:pPr lvl="4" marL="2160000" indent="-216000">
-              <a:spcBef>
-                <a:spcPts val="283"/>
-              </a:spcBef>
-              <a:buClr>
-                <a:srgbClr val="000000"/>
-              </a:buClr>
-              <a:buSzPct val="45000"/>
-              <a:buFont typeface="Wingdings" charset="2"/>
-              <a:buChar char=""/>
-            </a:pPr>
-            <a:r>
-              <a:rPr b="0" lang="sv-SE" sz="2000" spc="-1" strike="noStrike">
-                <a:latin typeface="Arial"/>
-              </a:rPr>
-              <a:t>Fifth Outline Level</a:t>
-            </a:r>
-            <a:endParaRPr b="0" lang="sv-SE" sz="2000" spc="-1" strike="noStrike">
-              <a:latin typeface="Arial"/>
-            </a:endParaRPr>
-          </a:p>
-          <a:p>
-            <a:pPr lvl="5" marL="2592000" indent="-216000">
-              <a:spcBef>
-                <a:spcPts val="283"/>
-              </a:spcBef>
-              <a:buClr>
-                <a:srgbClr val="000000"/>
-              </a:buClr>
-              <a:buSzPct val="45000"/>
-              <a:buFont typeface="Wingdings" charset="2"/>
-              <a:buChar char=""/>
-            </a:pPr>
-            <a:r>
-              <a:rPr b="0" lang="sv-SE" sz="2000" spc="-1" strike="noStrike">
-                <a:latin typeface="Arial"/>
-              </a:rPr>
-              <a:t>Sixth Outline Level</a:t>
-            </a:r>
-            <a:endParaRPr b="0" lang="sv-SE" sz="2000" spc="-1" strike="noStrike">
-              <a:latin typeface="Arial"/>
-            </a:endParaRPr>
-          </a:p>
-          <a:p>
-            <a:pPr lvl="6" marL="3024000" indent="-216000">
-              <a:spcBef>
-                <a:spcPts val="283"/>
-              </a:spcBef>
-              <a:buClr>
-                <a:srgbClr val="000000"/>
-              </a:buClr>
-              <a:buSzPct val="45000"/>
-              <a:buFont typeface="Wingdings" charset="2"/>
-              <a:buChar char=""/>
-            </a:pPr>
-            <a:r>
-              <a:rPr b="0" lang="sv-SE" sz="2000" spc="-1" strike="noStrike">
-                <a:latin typeface="Arial"/>
-              </a:rPr>
-              <a:t>Seventh Outline Level</a:t>
-            </a:r>
-            <a:endParaRPr b="0" lang="sv-SE" sz="2000" spc="-1" strike="noStrike">
-              <a:latin typeface="Arial"/>
-            </a:endParaRPr>
-          </a:p>
-        </p:txBody>
-      </p:sp>
     </p:spTree>
   </p:cSld>
   <p:clrMap bg1="lt1" bg2="lt2" tx1="dk1" tx2="dk2" accent1="accent1" accent2="accent2" accent3="accent3" accent4="accent4" accent5="accent5" accent6="accent6" hlink="hlink" folHlink="folHlink"/>
@@ -1647,14 +1431,14 @@
       </p:grpSpPr>
       <p:sp>
         <p:nvSpPr>
-          <p:cNvPr id="38" name="CustomShape 1"/>
+          <p:cNvPr id="36" name="CustomShape 1"/>
           <p:cNvSpPr/>
           <p:nvPr/>
         </p:nvSpPr>
         <p:spPr>
           <a:xfrm>
             <a:off x="3960000" y="2220120"/>
-            <a:ext cx="1509840" cy="515880"/>
+            <a:ext cx="1509480" cy="515880"/>
           </a:xfrm>
           <a:prstGeom prst="rect">
             <a:avLst/>
@@ -1698,14 +1482,14 @@
       </p:sp>
       <p:sp>
         <p:nvSpPr>
-          <p:cNvPr id="39" name="CustomShape 2"/>
+          <p:cNvPr id="37" name="CustomShape 2"/>
           <p:cNvSpPr/>
           <p:nvPr/>
         </p:nvSpPr>
         <p:spPr>
           <a:xfrm>
             <a:off x="72000" y="81000"/>
-            <a:ext cx="2231640" cy="363960"/>
+            <a:ext cx="2231280" cy="363960"/>
           </a:xfrm>
           <a:prstGeom prst="rect">
             <a:avLst/>
@@ -1751,14 +1535,14 @@
       </p:sp>
       <p:sp>
         <p:nvSpPr>
-          <p:cNvPr id="40" name="CustomShape 3"/>
+          <p:cNvPr id="38" name="CustomShape 3"/>
           <p:cNvSpPr/>
           <p:nvPr/>
         </p:nvSpPr>
         <p:spPr>
           <a:xfrm>
             <a:off x="7812000" y="1188000"/>
-            <a:ext cx="1995840" cy="987120"/>
+            <a:ext cx="1995480" cy="986760"/>
           </a:xfrm>
           <a:prstGeom prst="roundRect">
             <a:avLst>
@@ -1816,14 +1600,14 @@
       </p:sp>
       <p:sp>
         <p:nvSpPr>
-          <p:cNvPr id="41" name="CustomShape 4"/>
+          <p:cNvPr id="39" name="CustomShape 4"/>
           <p:cNvSpPr/>
           <p:nvPr/>
         </p:nvSpPr>
         <p:spPr>
           <a:xfrm>
             <a:off x="4176000" y="1512720"/>
-            <a:ext cx="3382560" cy="429840"/>
+            <a:ext cx="3382200" cy="429480"/>
           </a:xfrm>
           <a:custGeom>
             <a:avLst/>
@@ -1877,14 +1661,14 @@
       </p:sp>
       <p:sp>
         <p:nvSpPr>
-          <p:cNvPr id="42" name="CustomShape 5"/>
+          <p:cNvPr id="40" name="CustomShape 5"/>
           <p:cNvSpPr/>
           <p:nvPr/>
         </p:nvSpPr>
         <p:spPr>
           <a:xfrm>
             <a:off x="6363360" y="2232000"/>
-            <a:ext cx="1772640" cy="515880"/>
+            <a:ext cx="1772280" cy="515880"/>
           </a:xfrm>
           <a:prstGeom prst="rect">
             <a:avLst/>
@@ -1928,7 +1712,7 @@
       </p:sp>
       <p:sp>
         <p:nvSpPr>
-          <p:cNvPr id="43" name="Line 6"/>
+          <p:cNvPr id="41" name="Line 6"/>
           <p:cNvSpPr/>
           <p:nvPr/>
         </p:nvSpPr>
@@ -1956,7 +1740,7 @@
       </p:sp>
       <p:sp>
         <p:nvSpPr>
-          <p:cNvPr id="44" name="Line 7"/>
+          <p:cNvPr id="42" name="Line 7"/>
           <p:cNvSpPr/>
           <p:nvPr/>
         </p:nvSpPr>
@@ -1985,7 +1769,7 @@
       </p:sp>
       <p:sp>
         <p:nvSpPr>
-          <p:cNvPr id="45" name="Line 8"/>
+          <p:cNvPr id="43" name="Line 8"/>
           <p:cNvSpPr/>
           <p:nvPr/>
         </p:nvSpPr>
@@ -2013,14 +1797,14 @@
       </p:sp>
       <p:sp>
         <p:nvSpPr>
-          <p:cNvPr id="46" name="CustomShape 9"/>
+          <p:cNvPr id="44" name="CustomShape 9"/>
           <p:cNvSpPr/>
           <p:nvPr/>
         </p:nvSpPr>
         <p:spPr>
           <a:xfrm>
             <a:off x="8847360" y="2592000"/>
-            <a:ext cx="3104640" cy="302760"/>
+            <a:ext cx="3104280" cy="302760"/>
           </a:xfrm>
           <a:prstGeom prst="rect">
             <a:avLst/>
@@ -2064,14 +1848,14 @@
       </p:sp>
       <p:sp>
         <p:nvSpPr>
-          <p:cNvPr id="47" name="CustomShape 10"/>
+          <p:cNvPr id="45" name="CustomShape 10"/>
           <p:cNvSpPr/>
           <p:nvPr/>
         </p:nvSpPr>
         <p:spPr>
           <a:xfrm>
             <a:off x="4700160" y="3816000"/>
-            <a:ext cx="2283840" cy="1414080"/>
+            <a:ext cx="2283480" cy="1413720"/>
           </a:xfrm>
           <a:prstGeom prst="roundRect">
             <a:avLst>
@@ -2147,14 +1931,14 @@
       </p:sp>
       <p:sp>
         <p:nvSpPr>
-          <p:cNvPr id="48" name="CustomShape 11"/>
+          <p:cNvPr id="46" name="CustomShape 11"/>
           <p:cNvSpPr/>
           <p:nvPr/>
         </p:nvSpPr>
         <p:spPr>
           <a:xfrm>
             <a:off x="4700160" y="3816000"/>
-            <a:ext cx="2283840" cy="1414080"/>
+            <a:ext cx="2283480" cy="1413720"/>
           </a:xfrm>
           <a:prstGeom prst="roundRect">
             <a:avLst>
@@ -2250,14 +2034,14 @@
       </p:sp>
       <p:sp>
         <p:nvSpPr>
-          <p:cNvPr id="49" name="CustomShape 12"/>
+          <p:cNvPr id="47" name="CustomShape 12"/>
           <p:cNvSpPr/>
           <p:nvPr/>
         </p:nvSpPr>
         <p:spPr>
           <a:xfrm>
             <a:off x="1244160" y="5040000"/>
-            <a:ext cx="1995840" cy="987120"/>
+            <a:ext cx="1995480" cy="986760"/>
           </a:xfrm>
           <a:prstGeom prst="roundRect">
             <a:avLst>
@@ -2335,14 +2119,14 @@
       </p:sp>
       <p:sp>
         <p:nvSpPr>
-          <p:cNvPr id="50" name="CustomShape 13"/>
+          <p:cNvPr id="48" name="CustomShape 13"/>
           <p:cNvSpPr/>
           <p:nvPr/>
         </p:nvSpPr>
         <p:spPr>
           <a:xfrm>
             <a:off x="2835360" y="4176000"/>
-            <a:ext cx="1772640" cy="302760"/>
+            <a:ext cx="1772280" cy="302760"/>
           </a:xfrm>
           <a:prstGeom prst="rect">
             <a:avLst/>
@@ -2386,7 +2170,7 @@
       </p:sp>
       <p:sp>
         <p:nvSpPr>
-          <p:cNvPr id="51" name="Line 14"/>
+          <p:cNvPr id="49" name="Line 14"/>
           <p:cNvSpPr/>
           <p:nvPr/>
         </p:nvSpPr>
@@ -2414,7 +2198,7 @@
       </p:sp>
       <p:sp>
         <p:nvSpPr>
-          <p:cNvPr id="52" name="Line 15"/>
+          <p:cNvPr id="50" name="Line 15"/>
           <p:cNvSpPr/>
           <p:nvPr/>
         </p:nvSpPr>
@@ -2443,14 +2227,14 @@
       </p:sp>
       <p:sp>
         <p:nvSpPr>
-          <p:cNvPr id="53" name="CustomShape 16"/>
+          <p:cNvPr id="51" name="CustomShape 16"/>
           <p:cNvSpPr/>
           <p:nvPr/>
         </p:nvSpPr>
         <p:spPr>
           <a:xfrm flipH="1" rot="16154400">
-            <a:off x="1002240" y="3547080"/>
-            <a:ext cx="2553480" cy="288000"/>
+            <a:off x="1001880" y="3546720"/>
+            <a:ext cx="2553120" cy="287640"/>
           </a:xfrm>
           <a:custGeom>
             <a:avLst/>
@@ -2504,14 +2288,14 @@
       </p:sp>
       <p:sp>
         <p:nvSpPr>
-          <p:cNvPr id="54" name="CustomShape 17"/>
+          <p:cNvPr id="52" name="CustomShape 17"/>
           <p:cNvSpPr/>
           <p:nvPr/>
         </p:nvSpPr>
         <p:spPr>
           <a:xfrm>
             <a:off x="4391640" y="657720"/>
-            <a:ext cx="2231640" cy="638280"/>
+            <a:ext cx="2231280" cy="638280"/>
           </a:xfrm>
           <a:prstGeom prst="rect">
             <a:avLst/>
@@ -2577,14 +2361,14 @@
       </p:sp>
       <p:sp>
         <p:nvSpPr>
-          <p:cNvPr id="55" name="CustomShape 18"/>
+          <p:cNvPr id="53" name="CustomShape 18"/>
           <p:cNvSpPr/>
           <p:nvPr/>
         </p:nvSpPr>
         <p:spPr>
           <a:xfrm>
             <a:off x="1296000" y="1152000"/>
-            <a:ext cx="1995840" cy="987120"/>
+            <a:ext cx="1995480" cy="986760"/>
           </a:xfrm>
           <a:prstGeom prst="roundRect">
             <a:avLst>
@@ -2642,14 +2426,14 @@
       </p:sp>
       <p:sp>
         <p:nvSpPr>
-          <p:cNvPr id="56" name="CustomShape 19"/>
+          <p:cNvPr id="54" name="CustomShape 19"/>
           <p:cNvSpPr/>
           <p:nvPr/>
         </p:nvSpPr>
         <p:spPr>
           <a:xfrm>
             <a:off x="504000" y="3119400"/>
-            <a:ext cx="1512000" cy="1186920"/>
+            <a:ext cx="1511640" cy="1186920"/>
           </a:xfrm>
           <a:prstGeom prst="rect">
             <a:avLst/>
@@ -2715,14 +2499,14 @@
       </p:sp>
       <p:sp>
         <p:nvSpPr>
-          <p:cNvPr id="57" name="CustomShape 20"/>
+          <p:cNvPr id="55" name="CustomShape 20"/>
           <p:cNvSpPr/>
           <p:nvPr/>
         </p:nvSpPr>
         <p:spPr>
           <a:xfrm>
             <a:off x="4248000" y="5786280"/>
-            <a:ext cx="3312000" cy="981720"/>
+            <a:ext cx="3311640" cy="981360"/>
           </a:xfrm>
           <a:prstGeom prst="roundRect">
             <a:avLst>
@@ -2807,7 +2591,7 @@
       </p:sp>
       <p:sp>
         <p:nvSpPr>
-          <p:cNvPr id="58" name="Line 21"/>
+          <p:cNvPr id="56" name="Line 21"/>
           <p:cNvSpPr/>
           <p:nvPr/>
         </p:nvSpPr>
@@ -2835,14 +2619,14 @@
       </p:sp>
       <p:sp>
         <p:nvSpPr>
-          <p:cNvPr id="59" name="CustomShape 22"/>
+          <p:cNvPr id="57" name="CustomShape 22"/>
           <p:cNvSpPr/>
           <p:nvPr/>
         </p:nvSpPr>
         <p:spPr>
           <a:xfrm>
-            <a:off x="7848000" y="6105240"/>
-            <a:ext cx="3104640" cy="302760"/>
+            <a:off x="2439720" y="6393240"/>
+            <a:ext cx="3104280" cy="302760"/>
           </a:xfrm>
           <a:prstGeom prst="rect">
             <a:avLst/>
@@ -2883,6 +2667,95 @@
             </a:endParaRPr>
           </a:p>
         </p:txBody>
+      </p:sp>
+      <p:sp>
+        <p:nvSpPr>
+          <p:cNvPr id="58" name="CustomShape 23"/>
+          <p:cNvSpPr/>
+          <p:nvPr/>
+        </p:nvSpPr>
+        <p:spPr>
+          <a:xfrm>
+            <a:off x="8424000" y="5760000"/>
+            <a:ext cx="2231640" cy="981360"/>
+          </a:xfrm>
+          <a:prstGeom prst="roundRect">
+            <a:avLst>
+              <a:gd name="adj" fmla="val 16667"/>
+            </a:avLst>
+          </a:prstGeom>
+          <a:solidFill>
+            <a:srgbClr val="2a6099"/>
+          </a:solidFill>
+          <a:ln/>
+        </p:spPr>
+        <p:style>
+          <a:lnRef idx="2">
+            <a:schemeClr val="accent1">
+              <a:shade val="50000"/>
+            </a:schemeClr>
+          </a:lnRef>
+          <a:fillRef idx="1">
+            <a:schemeClr val="accent1"/>
+          </a:fillRef>
+          <a:effectRef idx="0">
+            <a:schemeClr val="accent1"/>
+          </a:effectRef>
+          <a:fontRef idx="minor"/>
+        </p:style>
+        <p:txBody>
+          <a:bodyPr lIns="90000" rIns="90000" tIns="45000" bIns="45000" anchor="ctr">
+            <a:noAutofit/>
+          </a:bodyPr>
+          <a:p>
+            <a:pPr algn="ctr">
+              <a:lnSpc>
+                <a:spcPct val="100000"/>
+              </a:lnSpc>
+            </a:pPr>
+            <a:r>
+              <a:rPr b="0" lang="sv-SE" sz="1800" spc="-1" strike="noStrike">
+                <a:solidFill>
+                  <a:srgbClr val="000000"/>
+                </a:solidFill>
+                <a:latin typeface="Arial"/>
+                <a:ea typeface="DejaVu Sans"/>
+              </a:rPr>
+              <a:t>Access Authorization</a:t>
+            </a:r>
+            <a:endParaRPr b="0" lang="sv-SE" sz="1800" spc="-1" strike="noStrike">
+              <a:latin typeface="Arial"/>
+            </a:endParaRPr>
+          </a:p>
+        </p:txBody>
+      </p:sp>
+      <p:sp>
+        <p:nvSpPr>
+          <p:cNvPr id="59" name="Line 24"/>
+          <p:cNvSpPr/>
+          <p:nvPr/>
+        </p:nvSpPr>
+        <p:spPr>
+          <a:xfrm>
+            <a:off x="7128000" y="5040000"/>
+            <a:ext cx="2232000" cy="648000"/>
+          </a:xfrm>
+          <a:prstGeom prst="line">
+            <a:avLst/>
+          </a:prstGeom>
+          <a:ln>
+            <a:solidFill>
+              <a:srgbClr val="3465a4"/>
+            </a:solidFill>
+            <a:tailEnd len="med" type="triangle" w="med"/>
+          </a:ln>
+        </p:spPr>
+        <p:style>
+          <a:lnRef idx="0"/>
+          <a:fillRef idx="0"/>
+          <a:effectRef idx="0"/>
+          <a:fontRef idx="minor"/>
+        </p:style>
       </p:sp>
     </p:spTree>
   </p:cSld>

</xml_diff>